<commit_message>
Changе the last slide of presentation
</commit_message>
<xml_diff>
--- a/docs/presentation.pptx
+++ b/docs/presentation.pptx
@@ -137,37 +137,7 @@
     </mc:Fallback>
   </mc:AlternateContent>
   <c:chart>
-    <c:title>
-      <c:overlay val="0"/>
-      <c:spPr>
-        <a:noFill/>
-        <a:ln>
-          <a:noFill/>
-        </a:ln>
-        <a:effectLst/>
-      </c:spPr>
-      <c:txPr>
-        <a:bodyPr rot="0" spcFirstLastPara="1" vertOverflow="ellipsis" vert="horz" wrap="square" anchor="ctr" anchorCtr="1"/>
-        <a:lstStyle/>
-        <a:p>
-          <a:pPr>
-            <a:defRPr sz="1862" b="0" i="0" u="none" strike="noStrike" kern="1200" spc="0" baseline="0">
-              <a:solidFill>
-                <a:schemeClr val="tx1">
-                  <a:lumMod val="65000"/>
-                  <a:lumOff val="35000"/>
-                </a:schemeClr>
-              </a:solidFill>
-              <a:latin typeface="+mn-lt"/>
-              <a:ea typeface="+mn-ea"/>
-              <a:cs typeface="+mn-cs"/>
-            </a:defRPr>
-          </a:pPr>
-          <a:endParaRPr lang="en-US"/>
-        </a:p>
-      </c:txPr>
-    </c:title>
-    <c:autoTitleDeleted val="0"/>
+    <c:autoTitleDeleted val="1"/>
     <c:plotArea>
       <c:layout/>
       <c:pieChart>
@@ -201,6 +171,11 @@
               </a:ln>
               <a:effectLst/>
             </c:spPr>
+            <c:extLst>
+              <c:ext xmlns:c16="http://schemas.microsoft.com/office/drawing/2014/chart" uri="{C3380CC4-5D6E-409C-BE32-E72D297353CC}">
+                <c16:uniqueId val="{00000001-EC2D-472C-922F-779BFEDB0321}"/>
+              </c:ext>
+            </c:extLst>
           </c:dPt>
           <c:dPt>
             <c:idx val="1"/>
@@ -216,6 +191,11 @@
               </a:ln>
               <a:effectLst/>
             </c:spPr>
+            <c:extLst>
+              <c:ext xmlns:c16="http://schemas.microsoft.com/office/drawing/2014/chart" uri="{C3380CC4-5D6E-409C-BE32-E72D297353CC}">
+                <c16:uniqueId val="{00000003-EC2D-472C-922F-779BFEDB0321}"/>
+              </c:ext>
+            </c:extLst>
           </c:dPt>
           <c:cat>
             <c:strRef>
@@ -273,6 +253,52 @@
     </c:plotArea>
     <c:legend>
       <c:legendPos val="b"/>
+      <c:legendEntry>
+        <c:idx val="0"/>
+        <c:txPr>
+          <a:bodyPr rot="0" spcFirstLastPara="1" vertOverflow="ellipsis" vert="horz" wrap="square" anchor="ctr" anchorCtr="1"/>
+          <a:lstStyle/>
+          <a:p>
+            <a:pPr>
+              <a:defRPr sz="1400" b="0" i="0" u="none" strike="noStrike" kern="1200" baseline="0">
+                <a:solidFill>
+                  <a:schemeClr val="tx1">
+                    <a:lumMod val="65000"/>
+                    <a:lumOff val="35000"/>
+                  </a:schemeClr>
+                </a:solidFill>
+                <a:latin typeface="+mn-lt"/>
+                <a:ea typeface="+mn-ea"/>
+                <a:cs typeface="+mn-cs"/>
+              </a:defRPr>
+            </a:pPr>
+            <a:endParaRPr lang="bg-BG"/>
+          </a:p>
+        </c:txPr>
+      </c:legendEntry>
+      <c:legendEntry>
+        <c:idx val="1"/>
+        <c:txPr>
+          <a:bodyPr rot="0" spcFirstLastPara="1" vertOverflow="ellipsis" vert="horz" wrap="square" anchor="ctr" anchorCtr="1"/>
+          <a:lstStyle/>
+          <a:p>
+            <a:pPr>
+              <a:defRPr sz="1400" b="0" i="0" u="none" strike="noStrike" kern="1200" baseline="0">
+                <a:solidFill>
+                  <a:schemeClr val="tx1">
+                    <a:lumMod val="65000"/>
+                    <a:lumOff val="35000"/>
+                  </a:schemeClr>
+                </a:solidFill>
+                <a:latin typeface="+mn-lt"/>
+                <a:ea typeface="+mn-ea"/>
+                <a:cs typeface="+mn-cs"/>
+              </a:defRPr>
+            </a:pPr>
+            <a:endParaRPr lang="bg-BG"/>
+          </a:p>
+        </c:txPr>
+      </c:legendEntry>
       <c:overlay val="0"/>
       <c:spPr>
         <a:noFill/>
@@ -298,7 +324,7 @@
               <a:cs typeface="+mn-cs"/>
             </a:defRPr>
           </a:pPr>
-          <a:endParaRPr lang="en-US"/>
+          <a:endParaRPr lang="bg-BG"/>
         </a:p>
       </c:txPr>
     </c:legend>
@@ -327,7 +353,7 @@
       <a:pPr>
         <a:defRPr/>
       </a:pPr>
-      <a:endParaRPr lang="en-US"/>
+      <a:endParaRPr lang="bg-BG"/>
     </a:p>
   </c:txPr>
   <c:externalData r:id="rId3">
@@ -977,7 +1003,7 @@
           <a:p>
             <a:fld id="{2DCBCC25-1AB8-46FE-B748-5EB4197D1FC5}" type="datetimeFigureOut">
               <a:rPr lang="en-US" smtClean="0"/>
-              <a:t>12/10/2022</a:t>
+              <a:t>12/14/2022</a:t>
             </a:fld>
             <a:endParaRPr lang="en-US"/>
           </a:p>
@@ -1440,7 +1466,7 @@
           <a:p>
             <a:fld id="{C8D715B0-D6D0-4585-A789-DDCFE88D8976}" type="datetimeFigureOut">
               <a:rPr lang="en-US" smtClean="0"/>
-              <a:t>12/10/2022</a:t>
+              <a:t>12/14/2022</a:t>
             </a:fld>
             <a:endParaRPr lang="en-US"/>
           </a:p>
@@ -1721,7 +1747,7 @@
           <a:p>
             <a:fld id="{C8D715B0-D6D0-4585-A789-DDCFE88D8976}" type="datetimeFigureOut">
               <a:rPr lang="en-US" smtClean="0"/>
-              <a:t>12/10/2022</a:t>
+              <a:t>12/14/2022</a:t>
             </a:fld>
             <a:endParaRPr lang="en-US"/>
           </a:p>
@@ -1913,7 +1939,7 @@
           <a:p>
             <a:fld id="{C8D715B0-D6D0-4585-A789-DDCFE88D8976}" type="datetimeFigureOut">
               <a:rPr lang="en-US" smtClean="0"/>
-              <a:t>12/10/2022</a:t>
+              <a:t>12/14/2022</a:t>
             </a:fld>
             <a:endParaRPr lang="en-US"/>
           </a:p>
@@ -2174,7 +2200,7 @@
           <a:p>
             <a:fld id="{C8D715B0-D6D0-4585-A789-DDCFE88D8976}" type="datetimeFigureOut">
               <a:rPr lang="en-US" smtClean="0"/>
-              <a:t>12/10/2022</a:t>
+              <a:t>12/14/2022</a:t>
             </a:fld>
             <a:endParaRPr lang="en-US"/>
           </a:p>
@@ -2600,7 +2626,7 @@
           <a:p>
             <a:fld id="{C8D715B0-D6D0-4585-A789-DDCFE88D8976}" type="datetimeFigureOut">
               <a:rPr lang="en-US" smtClean="0"/>
-              <a:t>12/10/2022</a:t>
+              <a:t>12/14/2022</a:t>
             </a:fld>
             <a:endParaRPr lang="en-US"/>
           </a:p>
@@ -3146,7 +3172,7 @@
           <a:p>
             <a:fld id="{C8D715B0-D6D0-4585-A789-DDCFE88D8976}" type="datetimeFigureOut">
               <a:rPr lang="en-US" smtClean="0"/>
-              <a:t>12/10/2022</a:t>
+              <a:t>12/14/2022</a:t>
             </a:fld>
             <a:endParaRPr lang="en-US"/>
           </a:p>
@@ -3977,7 +4003,7 @@
           <a:p>
             <a:fld id="{C8D715B0-D6D0-4585-A789-DDCFE88D8976}" type="datetimeFigureOut">
               <a:rPr lang="en-US" smtClean="0"/>
-              <a:t>12/10/2022</a:t>
+              <a:t>12/14/2022</a:t>
             </a:fld>
             <a:endParaRPr lang="en-US"/>
           </a:p>
@@ -4147,7 +4173,7 @@
           <a:p>
             <a:fld id="{C8D715B0-D6D0-4585-A789-DDCFE88D8976}" type="datetimeFigureOut">
               <a:rPr lang="en-US" smtClean="0"/>
-              <a:t>12/10/2022</a:t>
+              <a:t>12/14/2022</a:t>
             </a:fld>
             <a:endParaRPr lang="en-US"/>
           </a:p>
@@ -4327,7 +4353,7 @@
           <a:p>
             <a:fld id="{C8D715B0-D6D0-4585-A789-DDCFE88D8976}" type="datetimeFigureOut">
               <a:rPr lang="en-US" smtClean="0"/>
-              <a:t>12/10/2022</a:t>
+              <a:t>12/14/2022</a:t>
             </a:fld>
             <a:endParaRPr lang="en-US"/>
           </a:p>
@@ -4497,7 +4523,7 @@
           <a:p>
             <a:fld id="{C8D715B0-D6D0-4585-A789-DDCFE88D8976}" type="datetimeFigureOut">
               <a:rPr lang="en-US" smtClean="0"/>
-              <a:t>12/10/2022</a:t>
+              <a:t>12/14/2022</a:t>
             </a:fld>
             <a:endParaRPr lang="en-US"/>
           </a:p>
@@ -4754,7 +4780,7 @@
           <a:p>
             <a:fld id="{C8D715B0-D6D0-4585-A789-DDCFE88D8976}" type="datetimeFigureOut">
               <a:rPr lang="en-US" smtClean="0"/>
-              <a:t>12/10/2022</a:t>
+              <a:t>12/14/2022</a:t>
             </a:fld>
             <a:endParaRPr lang="en-US"/>
           </a:p>
@@ -4986,7 +5012,7 @@
           <a:p>
             <a:fld id="{C8D715B0-D6D0-4585-A789-DDCFE88D8976}" type="datetimeFigureOut">
               <a:rPr lang="en-US" smtClean="0"/>
-              <a:t>12/10/2022</a:t>
+              <a:t>12/14/2022</a:t>
             </a:fld>
             <a:endParaRPr lang="en-US"/>
           </a:p>
@@ -5379,7 +5405,7 @@
           <a:p>
             <a:fld id="{C8D715B0-D6D0-4585-A789-DDCFE88D8976}" type="datetimeFigureOut">
               <a:rPr lang="en-US" smtClean="0"/>
-              <a:t>12/10/2022</a:t>
+              <a:t>12/14/2022</a:t>
             </a:fld>
             <a:endParaRPr lang="en-US"/>
           </a:p>
@@ -5497,7 +5523,7 @@
           <a:p>
             <a:fld id="{C8D715B0-D6D0-4585-A789-DDCFE88D8976}" type="datetimeFigureOut">
               <a:rPr lang="en-US" smtClean="0"/>
-              <a:t>12/10/2022</a:t>
+              <a:t>12/14/2022</a:t>
             </a:fld>
             <a:endParaRPr lang="en-US"/>
           </a:p>
@@ -5592,7 +5618,7 @@
           <a:p>
             <a:fld id="{C8D715B0-D6D0-4585-A789-DDCFE88D8976}" type="datetimeFigureOut">
               <a:rPr lang="en-US" smtClean="0"/>
-              <a:t>12/10/2022</a:t>
+              <a:t>12/14/2022</a:t>
             </a:fld>
             <a:endParaRPr lang="en-US"/>
           </a:p>
@@ -5865,7 +5891,7 @@
           <a:p>
             <a:fld id="{C8D715B0-D6D0-4585-A789-DDCFE88D8976}" type="datetimeFigureOut">
               <a:rPr lang="en-US" smtClean="0"/>
-              <a:t>12/10/2022</a:t>
+              <a:t>12/14/2022</a:t>
             </a:fld>
             <a:endParaRPr lang="en-US"/>
           </a:p>
@@ -6146,7 +6172,7 @@
           <a:p>
             <a:fld id="{C8D715B0-D6D0-4585-A789-DDCFE88D8976}" type="datetimeFigureOut">
               <a:rPr lang="en-US" smtClean="0"/>
-              <a:t>12/10/2022</a:t>
+              <a:t>12/14/2022</a:t>
             </a:fld>
             <a:endParaRPr lang="en-US"/>
           </a:p>
@@ -6386,7 +6412,7 @@
           <a:p>
             <a:fld id="{C8D715B0-D6D0-4585-A789-DDCFE88D8976}" type="datetimeFigureOut">
               <a:rPr lang="en-US" smtClean="0"/>
-              <a:t>12/10/2022</a:t>
+              <a:t>12/14/2022</a:t>
             </a:fld>
             <a:endParaRPr lang="en-US"/>
           </a:p>
@@ -6966,7 +6992,7 @@
         </p:nvSpPr>
         <p:spPr>
           <a:xfrm>
-            <a:off x="1524000" y="3429000"/>
+            <a:off x="1524000" y="2949606"/>
             <a:ext cx="9144000" cy="1641490"/>
           </a:xfrm>
         </p:spPr>
@@ -7001,7 +7027,7 @@
         </p:nvSpPr>
         <p:spPr>
           <a:xfrm>
-            <a:off x="1524000" y="2674975"/>
+            <a:off x="1524000" y="2195581"/>
             <a:ext cx="9144000" cy="754025"/>
           </a:xfrm>
         </p:spPr>
@@ -7026,13 +7052,13 @@
   <p:clrMapOvr>
     <a:masterClrMapping/>
   </p:clrMapOvr>
-  <mc:AlternateContent xmlns:mc="http://schemas.openxmlformats.org/markup-compatibility/2006">
-    <mc:Choice xmlns:p15="http://schemas.microsoft.com/office/powerpoint/2012/main" Requires="p15">
+  <mc:AlternateContent xmlns:mc="http://schemas.openxmlformats.org/markup-compatibility/2006" xmlns:p15="http://schemas.microsoft.com/office/powerpoint/2012/main">
+    <mc:Choice Requires="p15">
       <p:transition xmlns:p14="http://schemas.microsoft.com/office/powerpoint/2010/main" spd="slow" p14:dur="5000">
         <p15:prstTrans prst="curtains"/>
       </p:transition>
     </mc:Choice>
-    <mc:Fallback>
+    <mc:Fallback xmlns="">
       <p:transition spd="slow">
         <p:fade/>
       </p:transition>
@@ -7419,7 +7445,7 @@
         </p:nvSpPr>
         <p:spPr>
           <a:xfrm>
-            <a:off x="1332755" y="4400154"/>
+            <a:off x="4099219" y="4606562"/>
             <a:ext cx="1420585" cy="1420585"/>
           </a:xfrm>
           <a:prstGeom prst="donut">
@@ -7457,56 +7483,6 @@
       </p:sp>
       <p:sp>
         <p:nvSpPr>
-          <p:cNvPr id="7" name="Circle: Hollow 6">
-            <a:extLst>
-              <a:ext uri="{FF2B5EF4-FFF2-40B4-BE49-F238E27FC236}">
-                <a16:creationId xmlns:a16="http://schemas.microsoft.com/office/drawing/2014/main" id="{AC8F4F1C-7EF0-B9D7-BE2A-5F5BE02C5AAB}"/>
-              </a:ext>
-            </a:extLst>
-          </p:cNvPr>
-          <p:cNvSpPr/>
-          <p:nvPr/>
-        </p:nvSpPr>
-        <p:spPr>
-          <a:xfrm>
-            <a:off x="7487720" y="4400154"/>
-            <a:ext cx="1420585" cy="1420585"/>
-          </a:xfrm>
-          <a:prstGeom prst="donut">
-            <a:avLst/>
-          </a:prstGeom>
-        </p:spPr>
-        <p:style>
-          <a:lnRef idx="2">
-            <a:schemeClr val="accent1">
-              <a:shade val="50000"/>
-            </a:schemeClr>
-          </a:lnRef>
-          <a:fillRef idx="1">
-            <a:schemeClr val="accent1"/>
-          </a:fillRef>
-          <a:effectRef idx="0">
-            <a:schemeClr val="accent1"/>
-          </a:effectRef>
-          <a:fontRef idx="minor">
-            <a:schemeClr val="lt1"/>
-          </a:fontRef>
-        </p:style>
-        <p:txBody>
-          <a:bodyPr rtlCol="0" anchor="ctr"/>
-          <a:lstStyle/>
-          <a:p>
-            <a:pPr algn="ctr"/>
-            <a:endParaRPr lang="en-US">
-              <a:solidFill>
-                <a:schemeClr val="tx1"/>
-              </a:solidFill>
-            </a:endParaRPr>
-          </a:p>
-        </p:txBody>
-      </p:sp>
-      <p:sp>
-        <p:nvSpPr>
           <p:cNvPr id="8" name="TextBox 7">
             <a:extLst>
               <a:ext uri="{FF2B5EF4-FFF2-40B4-BE49-F238E27FC236}">
@@ -7519,8 +7495,8 @@
         </p:nvSpPr>
         <p:spPr>
           <a:xfrm>
-            <a:off x="2781195" y="2708839"/>
-            <a:ext cx="2269673" cy="400110"/>
+            <a:off x="2900298" y="2678062"/>
+            <a:ext cx="2269673" cy="461665"/>
           </a:xfrm>
           <a:prstGeom prst="rect">
             <a:avLst/>
@@ -7534,10 +7510,10 @@
           <a:lstStyle/>
           <a:p>
             <a:r>
-              <a:rPr lang="bg-BG" sz="2000" b="1" dirty="0"/>
+              <a:rPr lang="bg-BG" sz="2400" b="1" dirty="0"/>
               <a:t>Нашият отбор</a:t>
             </a:r>
-            <a:endParaRPr lang="en-US" sz="2000" b="1" dirty="0"/>
+            <a:endParaRPr lang="en-US" sz="2400" b="1" dirty="0"/>
           </a:p>
         </p:txBody>
       </p:sp>
@@ -7627,8 +7603,8 @@
         </p:nvSpPr>
         <p:spPr>
           <a:xfrm>
-            <a:off x="8942693" y="2499324"/>
-            <a:ext cx="1933549" cy="954107"/>
+            <a:off x="9049226" y="2357304"/>
+            <a:ext cx="1933549" cy="1261884"/>
           </a:xfrm>
           <a:prstGeom prst="rect">
             <a:avLst/>
@@ -7642,18 +7618,18 @@
           <a:lstStyle/>
           <a:p>
             <a:r>
-              <a:rPr lang="bg-BG" b="1" dirty="0"/>
+              <a:rPr lang="bg-BG" sz="2400" b="1" dirty="0"/>
               <a:t>Създаване на </a:t>
             </a:r>
             <a:r>
-              <a:rPr lang="bg-BG" sz="2000" b="1" dirty="0"/>
+              <a:rPr lang="bg-BG" sz="2800" b="1" dirty="0"/>
               <a:t>идеята</a:t>
             </a:r>
             <a:r>
-              <a:rPr lang="bg-BG" b="1" dirty="0"/>
+              <a:rPr lang="bg-BG" sz="2400" b="1" dirty="0"/>
               <a:t> за проекта</a:t>
             </a:r>
-            <a:endParaRPr lang="en-US" b="1" dirty="0"/>
+            <a:endParaRPr lang="en-US" sz="2400" b="1" dirty="0"/>
           </a:p>
         </p:txBody>
       </p:sp>
@@ -7671,8 +7647,8 @@
         </p:nvSpPr>
         <p:spPr>
           <a:xfrm>
-            <a:off x="2900298" y="4756503"/>
-            <a:ext cx="1812471" cy="707886"/>
+            <a:off x="5666762" y="4962911"/>
+            <a:ext cx="1812471" cy="830997"/>
           </a:xfrm>
           <a:prstGeom prst="rect">
             <a:avLst/>
@@ -7686,46 +7662,10 @@
           <a:lstStyle/>
           <a:p>
             <a:r>
-              <a:rPr lang="bg-BG" sz="2000" b="1" dirty="0"/>
+              <a:rPr lang="bg-BG" sz="2400" b="1" dirty="0"/>
               <a:t>Развитие на проекта</a:t>
             </a:r>
-            <a:endParaRPr lang="en-US" sz="2000" b="1" dirty="0"/>
-          </a:p>
-        </p:txBody>
-      </p:sp>
-      <p:sp>
-        <p:nvSpPr>
-          <p:cNvPr id="13" name="TextBox 12">
-            <a:extLst>
-              <a:ext uri="{FF2B5EF4-FFF2-40B4-BE49-F238E27FC236}">
-                <a16:creationId xmlns:a16="http://schemas.microsoft.com/office/drawing/2014/main" id="{EB5398B6-1718-27D6-6210-B031B6B0E64A}"/>
-              </a:ext>
-            </a:extLst>
-          </p:cNvPr>
-          <p:cNvSpPr txBox="1"/>
-          <p:nvPr/>
-        </p:nvSpPr>
-        <p:spPr>
-          <a:xfrm>
-            <a:off x="9143015" y="4756503"/>
-            <a:ext cx="1741714" cy="707886"/>
-          </a:xfrm>
-          <a:prstGeom prst="rect">
-            <a:avLst/>
-          </a:prstGeom>
-          <a:noFill/>
-        </p:spPr>
-        <p:txBody>
-          <a:bodyPr wrap="square" rtlCol="0">
-            <a:spAutoFit/>
-          </a:bodyPr>
-          <a:lstStyle/>
-          <a:p>
-            <a:r>
-              <a:rPr lang="bg-BG" sz="2000" b="1" dirty="0"/>
-              <a:t>Завършване на проекта</a:t>
-            </a:r>
-            <a:endParaRPr lang="en-US" sz="2000" b="1" dirty="0"/>
+            <a:endParaRPr lang="en-US" sz="2400" b="1" dirty="0"/>
           </a:p>
         </p:txBody>
       </p:sp>
@@ -7743,7 +7683,7 @@
         </p:nvSpPr>
         <p:spPr>
           <a:xfrm>
-            <a:off x="1855510" y="4710522"/>
+            <a:off x="4621974" y="4916930"/>
             <a:ext cx="947058" cy="646331"/>
           </a:xfrm>
           <a:prstGeom prst="rect">
@@ -7760,42 +7700,6 @@
             <a:r>
               <a:rPr lang="bg-BG" sz="3600" dirty="0"/>
               <a:t>3</a:t>
-            </a:r>
-            <a:endParaRPr lang="en-US" sz="3600" dirty="0"/>
-          </a:p>
-        </p:txBody>
-      </p:sp>
-      <p:sp>
-        <p:nvSpPr>
-          <p:cNvPr id="15" name="TextBox 14">
-            <a:extLst>
-              <a:ext uri="{FF2B5EF4-FFF2-40B4-BE49-F238E27FC236}">
-                <a16:creationId xmlns:a16="http://schemas.microsoft.com/office/drawing/2014/main" id="{8E73EFEA-3AD3-0582-E6E0-127E02D96FB5}"/>
-              </a:ext>
-            </a:extLst>
-          </p:cNvPr>
-          <p:cNvSpPr txBox="1"/>
-          <p:nvPr/>
-        </p:nvSpPr>
-        <p:spPr>
-          <a:xfrm>
-            <a:off x="7985914" y="4710521"/>
-            <a:ext cx="604157" cy="646331"/>
-          </a:xfrm>
-          <a:prstGeom prst="rect">
-            <a:avLst/>
-          </a:prstGeom>
-          <a:noFill/>
-        </p:spPr>
-        <p:txBody>
-          <a:bodyPr wrap="square" rtlCol="0">
-            <a:spAutoFit/>
-          </a:bodyPr>
-          <a:lstStyle/>
-          <a:p>
-            <a:r>
-              <a:rPr lang="bg-BG" sz="3600" dirty="0"/>
-              <a:t>4</a:t>
             </a:r>
             <a:endParaRPr lang="en-US" sz="3600" dirty="0"/>
           </a:p>
@@ -8497,228 +8401,6 @@
                             </p:childTnLst>
                           </p:cTn>
                         </p:par>
-                        <p:par>
-                          <p:cTn id="58" fill="hold">
-                            <p:stCondLst>
-                              <p:cond delay="10350"/>
-                            </p:stCondLst>
-                            <p:childTnLst>
-                              <p:par>
-                                <p:cTn id="59" presetID="52" presetClass="entr" presetSubtype="0" fill="hold" grpId="0" nodeType="afterEffect">
-                                  <p:stCondLst>
-                                    <p:cond delay="0"/>
-                                  </p:stCondLst>
-                                  <p:childTnLst>
-                                    <p:set>
-                                      <p:cBhvr>
-                                        <p:cTn id="60" dur="1" fill="hold">
-                                          <p:stCondLst>
-                                            <p:cond delay="0"/>
-                                          </p:stCondLst>
-                                        </p:cTn>
-                                        <p:tgtEl>
-                                          <p:spTgt spid="7"/>
-                                        </p:tgtEl>
-                                        <p:attrNameLst>
-                                          <p:attrName>style.visibility</p:attrName>
-                                        </p:attrNameLst>
-                                      </p:cBhvr>
-                                      <p:to>
-                                        <p:strVal val="visible"/>
-                                      </p:to>
-                                    </p:set>
-                                    <p:animScale>
-                                      <p:cBhvr>
-                                        <p:cTn id="61" dur="1150" decel="50000" fill="hold">
-                                          <p:stCondLst>
-                                            <p:cond delay="0"/>
-                                          </p:stCondLst>
-                                        </p:cTn>
-                                        <p:tgtEl>
-                                          <p:spTgt spid="7"/>
-                                        </p:tgtEl>
-                                      </p:cBhvr>
-                                      <p:from x="250000" y="250000"/>
-                                      <p:to x="100000" y="100000"/>
-                                    </p:animScale>
-                                    <p:animMotion origin="layout" path="M -0.46736 0.92887  C -0.37517 0.88508  -0.02552 0.75279  0.0908 0.66613  C  0.20747 0.57948  0.21649 0.50394  0.23177 0.40825  C 0.24705 0.31256  0.22118 0.15964   0.18264 0.09152  C 0.1441 0.02341  0.03802 0.0  0.0 0.0  " pathEditMode="relative" ptsTypes="">
-                                      <p:cBhvr>
-                                        <p:cTn id="62" dur="1150" decel="50000" fill="hold">
-                                          <p:stCondLst>
-                                            <p:cond delay="0"/>
-                                          </p:stCondLst>
-                                        </p:cTn>
-                                        <p:tgtEl>
-                                          <p:spTgt spid="7"/>
-                                        </p:tgtEl>
-                                        <p:attrNameLst>
-                                          <p:attrName>ppt_x</p:attrName>
-                                          <p:attrName>ppt_y</p:attrName>
-                                        </p:attrNameLst>
-                                      </p:cBhvr>
-                                    </p:animMotion>
-                                    <p:animEffect transition="in" filter="fade">
-                                      <p:cBhvr>
-                                        <p:cTn id="63" dur="1150"/>
-                                        <p:tgtEl>
-                                          <p:spTgt spid="7"/>
-                                        </p:tgtEl>
-                                      </p:cBhvr>
-                                    </p:animEffect>
-                                  </p:childTnLst>
-                                </p:cTn>
-                              </p:par>
-                            </p:childTnLst>
-                          </p:cTn>
-                        </p:par>
-                        <p:par>
-                          <p:cTn id="64" fill="hold">
-                            <p:stCondLst>
-                              <p:cond delay="11500"/>
-                            </p:stCondLst>
-                            <p:childTnLst>
-                              <p:par>
-                                <p:cTn id="65" presetID="52" presetClass="entr" presetSubtype="0" fill="hold" grpId="0" nodeType="afterEffect">
-                                  <p:stCondLst>
-                                    <p:cond delay="0"/>
-                                  </p:stCondLst>
-                                  <p:childTnLst>
-                                    <p:set>
-                                      <p:cBhvr>
-                                        <p:cTn id="66" dur="1" fill="hold">
-                                          <p:stCondLst>
-                                            <p:cond delay="0"/>
-                                          </p:stCondLst>
-                                        </p:cTn>
-                                        <p:tgtEl>
-                                          <p:spTgt spid="13"/>
-                                        </p:tgtEl>
-                                        <p:attrNameLst>
-                                          <p:attrName>style.visibility</p:attrName>
-                                        </p:attrNameLst>
-                                      </p:cBhvr>
-                                      <p:to>
-                                        <p:strVal val="visible"/>
-                                      </p:to>
-                                    </p:set>
-                                    <p:animScale>
-                                      <p:cBhvr>
-                                        <p:cTn id="67" dur="1150" decel="50000" fill="hold">
-                                          <p:stCondLst>
-                                            <p:cond delay="0"/>
-                                          </p:stCondLst>
-                                        </p:cTn>
-                                        <p:tgtEl>
-                                          <p:spTgt spid="13"/>
-                                        </p:tgtEl>
-                                      </p:cBhvr>
-                                      <p:from x="250000" y="250000"/>
-                                      <p:to x="100000" y="100000"/>
-                                    </p:animScale>
-                                    <p:animMotion origin="layout" path="M -0.46736 0.92887  C -0.37517 0.88508  -0.02552 0.75279  0.0908 0.66613  C  0.20747 0.57948  0.21649 0.50394  0.23177 0.40825  C 0.24705 0.31256  0.22118 0.15964   0.18264 0.09152  C 0.1441 0.02341  0.03802 0.0  0.0 0.0  " pathEditMode="relative" ptsTypes="">
-                                      <p:cBhvr>
-                                        <p:cTn id="68" dur="1150" decel="50000" fill="hold">
-                                          <p:stCondLst>
-                                            <p:cond delay="0"/>
-                                          </p:stCondLst>
-                                        </p:cTn>
-                                        <p:tgtEl>
-                                          <p:spTgt spid="13"/>
-                                        </p:tgtEl>
-                                        <p:attrNameLst>
-                                          <p:attrName>ppt_x</p:attrName>
-                                          <p:attrName>ppt_y</p:attrName>
-                                        </p:attrNameLst>
-                                      </p:cBhvr>
-                                    </p:animMotion>
-                                    <p:animEffect transition="in" filter="fade">
-                                      <p:cBhvr>
-                                        <p:cTn id="69" dur="1150"/>
-                                        <p:tgtEl>
-                                          <p:spTgt spid="13"/>
-                                        </p:tgtEl>
-                                      </p:cBhvr>
-                                    </p:animEffect>
-                                  </p:childTnLst>
-                                </p:cTn>
-                              </p:par>
-                            </p:childTnLst>
-                          </p:cTn>
-                        </p:par>
-                        <p:par>
-                          <p:cTn id="70" fill="hold">
-                            <p:stCondLst>
-                              <p:cond delay="12650"/>
-                            </p:stCondLst>
-                            <p:childTnLst>
-                              <p:par>
-                                <p:cTn id="71" presetID="52" presetClass="entr" presetSubtype="0" fill="hold" grpId="0" nodeType="afterEffect">
-                                  <p:stCondLst>
-                                    <p:cond delay="0"/>
-                                  </p:stCondLst>
-                                  <p:childTnLst>
-                                    <p:set>
-                                      <p:cBhvr>
-                                        <p:cTn id="72" dur="1" fill="hold">
-                                          <p:stCondLst>
-                                            <p:cond delay="0"/>
-                                          </p:stCondLst>
-                                        </p:cTn>
-                                        <p:tgtEl>
-                                          <p:spTgt spid="15"/>
-                                        </p:tgtEl>
-                                        <p:attrNameLst>
-                                          <p:attrName>style.visibility</p:attrName>
-                                        </p:attrNameLst>
-                                      </p:cBhvr>
-                                      <p:to>
-                                        <p:strVal val="visible"/>
-                                      </p:to>
-                                    </p:set>
-                                    <p:animScale>
-                                      <p:cBhvr>
-                                        <p:cTn id="73" dur="1150" decel="50000" fill="hold">
-                                          <p:stCondLst>
-                                            <p:cond delay="0"/>
-                                          </p:stCondLst>
-                                        </p:cTn>
-                                        <p:tgtEl>
-                                          <p:spTgt spid="15"/>
-                                        </p:tgtEl>
-                                      </p:cBhvr>
-                                      <p:from x="250000" y="250000"/>
-                                      <p:to x="100000" y="100000"/>
-                                    </p:animScale>
-                                    <p:animMotion origin="layout" path="M -0.46736 0.92887  C -0.37517 0.88508  -0.02552 0.75279  0.0908 0.66613  C  0.20747 0.57948  0.21649 0.50394  0.23177 0.40825  C 0.24705 0.31256  0.22118 0.15964   0.18264 0.09152  C 0.1441 0.02341  0.03802 0.0  0.0 0.0  " pathEditMode="relative" ptsTypes="">
-                                      <p:cBhvr>
-                                        <p:cTn id="74" dur="1150" decel="50000" fill="hold">
-                                          <p:stCondLst>
-                                            <p:cond delay="0"/>
-                                          </p:stCondLst>
-                                        </p:cTn>
-                                        <p:tgtEl>
-                                          <p:spTgt spid="15"/>
-                                        </p:tgtEl>
-                                        <p:attrNameLst>
-                                          <p:attrName>ppt_x</p:attrName>
-                                          <p:attrName>ppt_y</p:attrName>
-                                        </p:attrNameLst>
-                                      </p:cBhvr>
-                                    </p:animMotion>
-                                    <p:animEffect transition="in" filter="fade">
-                                      <p:cBhvr>
-                                        <p:cTn id="75" dur="1150"/>
-                                        <p:tgtEl>
-                                          <p:spTgt spid="15"/>
-                                        </p:tgtEl>
-                                      </p:cBhvr>
-                                    </p:animEffect>
-                                  </p:childTnLst>
-                                </p:cTn>
-                              </p:par>
-                            </p:childTnLst>
-                          </p:cTn>
-                        </p:par>
                       </p:childTnLst>
                     </p:cTn>
                   </p:par>
@@ -8747,15 +8429,12 @@
       <p:bldP spid="4" grpId="0" animBg="1"/>
       <p:bldP spid="5" grpId="0" animBg="1"/>
       <p:bldP spid="6" grpId="0" animBg="1"/>
-      <p:bldP spid="7" grpId="0" animBg="1"/>
       <p:bldP spid="8" grpId="0"/>
       <p:bldP spid="9" grpId="0"/>
       <p:bldP spid="10" grpId="0"/>
       <p:bldP spid="11" grpId="0"/>
       <p:bldP spid="12" grpId="0"/>
-      <p:bldP spid="13" grpId="0"/>
       <p:bldP spid="14" grpId="0"/>
-      <p:bldP spid="15" grpId="0"/>
     </p:bldLst>
   </p:timing>
 </p:sld>
@@ -8778,56 +8457,36 @@
           <a:chExt cx="0" cy="0"/>
         </a:xfrm>
       </p:grpSpPr>
-      <p:sp>
-        <p:nvSpPr>
-          <p:cNvPr id="4" name="Circle: Hollow 3">
+      <p:pic>
+        <p:nvPicPr>
+          <p:cNvPr id="2" name="Picture 1">
             <a:extLst>
               <a:ext uri="{FF2B5EF4-FFF2-40B4-BE49-F238E27FC236}">
-                <a16:creationId xmlns:a16="http://schemas.microsoft.com/office/drawing/2014/main" id="{BA971BFE-89E2-C3E4-9469-8BE0DE2D3284}"/>
+                <a16:creationId xmlns:a16="http://schemas.microsoft.com/office/drawing/2014/main" id="{77EB1C50-2322-2255-AE57-AA1CABE66124}"/>
               </a:ext>
             </a:extLst>
           </p:cNvPr>
-          <p:cNvSpPr/>
+          <p:cNvPicPr>
+            <a:picLocks noChangeAspect="1"/>
+          </p:cNvPicPr>
           <p:nvPr/>
-        </p:nvSpPr>
+        </p:nvPicPr>
+        <p:blipFill>
+          <a:blip r:embed="rId2"/>
+          <a:stretch>
+            <a:fillRect/>
+          </a:stretch>
+        </p:blipFill>
         <p:spPr>
           <a:xfrm>
-            <a:off x="4955877" y="2288877"/>
-            <a:ext cx="2280245" cy="2280245"/>
+            <a:off x="4729728" y="1195617"/>
+            <a:ext cx="2572735" cy="2536156"/>
           </a:xfrm>
-          <a:prstGeom prst="donut">
+          <a:prstGeom prst="rect">
             <a:avLst/>
           </a:prstGeom>
         </p:spPr>
-        <p:style>
-          <a:lnRef idx="2">
-            <a:schemeClr val="accent1">
-              <a:shade val="50000"/>
-            </a:schemeClr>
-          </a:lnRef>
-          <a:fillRef idx="1">
-            <a:schemeClr val="accent1"/>
-          </a:fillRef>
-          <a:effectRef idx="0">
-            <a:schemeClr val="accent1"/>
-          </a:effectRef>
-          <a:fontRef idx="minor">
-            <a:schemeClr val="lt1"/>
-          </a:fontRef>
-        </p:style>
-        <p:txBody>
-          <a:bodyPr rtlCol="0" anchor="ctr"/>
-          <a:lstStyle/>
-          <a:p>
-            <a:pPr algn="ctr"/>
-            <a:endParaRPr lang="en-US">
-              <a:solidFill>
-                <a:schemeClr val="tx1"/>
-              </a:solidFill>
-            </a:endParaRPr>
-          </a:p>
-        </p:txBody>
-      </p:sp>
+      </p:pic>
       <p:sp>
         <p:nvSpPr>
           <p:cNvPr id="5" name="TextBox 4">
@@ -8842,8 +8501,8 @@
         </p:nvSpPr>
         <p:spPr>
           <a:xfrm>
-            <a:off x="5817134" y="2855855"/>
-            <a:ext cx="697811" cy="1015663"/>
+            <a:off x="5667189" y="1538179"/>
+            <a:ext cx="697811" cy="1569660"/>
           </a:xfrm>
           <a:prstGeom prst="rect">
             <a:avLst/>
@@ -8857,10 +8516,10 @@
           <a:lstStyle/>
           <a:p>
             <a:r>
-              <a:rPr lang="bg-BG" sz="6000" dirty="0"/>
+              <a:rPr lang="bg-BG" sz="9600" dirty="0"/>
               <a:t>1</a:t>
             </a:r>
-            <a:endParaRPr lang="en-US" sz="6000" dirty="0"/>
+            <a:endParaRPr lang="en-US" sz="9600" dirty="0"/>
           </a:p>
         </p:txBody>
       </p:sp>
@@ -8878,8 +8537,8 @@
         </p:nvSpPr>
         <p:spPr>
           <a:xfrm>
-            <a:off x="3464117" y="4959386"/>
-            <a:ext cx="5263763" cy="707886"/>
+            <a:off x="3118453" y="3920700"/>
+            <a:ext cx="5955091" cy="1200329"/>
           </a:xfrm>
           <a:prstGeom prst="rect">
             <a:avLst/>
@@ -8894,10 +8553,10 @@
           <a:p>
             <a:pPr algn="ctr"/>
             <a:r>
-              <a:rPr lang="bg-BG" sz="4000" dirty="0"/>
+              <a:rPr lang="bg-BG" sz="7200" dirty="0"/>
               <a:t>Нашият отбор</a:t>
             </a:r>
-            <a:endParaRPr lang="en-US" sz="4000" dirty="0"/>
+            <a:endParaRPr lang="en-US" sz="7200" dirty="0"/>
           </a:p>
         </p:txBody>
       </p:sp>
@@ -8911,13 +8570,13 @@
   <p:clrMapOvr>
     <a:masterClrMapping/>
   </p:clrMapOvr>
-  <mc:AlternateContent xmlns:mc="http://schemas.openxmlformats.org/markup-compatibility/2006">
-    <mc:Choice xmlns:p14="http://schemas.microsoft.com/office/powerpoint/2010/main" Requires="p14">
+  <mc:AlternateContent xmlns:mc="http://schemas.openxmlformats.org/markup-compatibility/2006" xmlns:p14="http://schemas.microsoft.com/office/powerpoint/2010/main">
+    <mc:Choice Requires="p14">
       <p:transition spd="slow" p14:dur="1600">
         <p:blinds dir="vert"/>
       </p:transition>
     </mc:Choice>
-    <mc:Fallback>
+    <mc:Fallback xmlns="">
       <p:transition spd="slow">
         <p:blinds dir="vert"/>
       </p:transition>
@@ -8960,7 +8619,7 @@
                                           </p:stCondLst>
                                         </p:cTn>
                                         <p:tgtEl>
-                                          <p:spTgt spid="4"/>
+                                          <p:spTgt spid="5"/>
                                         </p:tgtEl>
                                         <p:attrNameLst>
                                           <p:attrName>style.visibility</p:attrName>
@@ -8974,7 +8633,7 @@
                                       <p:cBhvr>
                                         <p:cTn id="7" dur="100"/>
                                         <p:tgtEl>
-                                          <p:spTgt spid="4"/>
+                                          <p:spTgt spid="5"/>
                                         </p:tgtEl>
                                       </p:cBhvr>
                                     </p:animEffect>
@@ -8982,7 +8641,7 @@
                                       <p:cBhvr>
                                         <p:cTn id="8" dur="400" fill="hold"/>
                                         <p:tgtEl>
-                                          <p:spTgt spid="4"/>
+                                          <p:spTgt spid="5"/>
                                         </p:tgtEl>
                                         <p:attrNameLst>
                                           <p:attrName>ppt_x</p:attrName>
@@ -9005,7 +8664,7 @@
                                       <p:cBhvr>
                                         <p:cTn id="9" dur="400" fill="hold"/>
                                         <p:tgtEl>
-                                          <p:spTgt spid="4"/>
+                                          <p:spTgt spid="5"/>
                                         </p:tgtEl>
                                         <p:attrNameLst>
                                           <p:attrName>ppt_y</p:attrName>
@@ -9032,7 +8691,7 @@
                                           </p:stCondLst>
                                         </p:cTn>
                                         <p:tgtEl>
-                                          <p:spTgt spid="4"/>
+                                          <p:spTgt spid="5"/>
                                         </p:tgtEl>
                                         <p:attrNameLst>
                                           <p:attrName>ppt_x</p:attrName>
@@ -9154,7 +8813,7 @@
                                           </p:stCondLst>
                                         </p:cTn>
                                         <p:tgtEl>
-                                          <p:spTgt spid="4"/>
+                                          <p:spTgt spid="5"/>
                                         </p:tgtEl>
                                         <p:attrNameLst>
                                           <p:attrName>ppt_y</p:attrName>
@@ -9294,7 +8953,7 @@
                                           </p:stCondLst>
                                         </p:cTn>
                                         <p:tgtEl>
-                                          <p:spTgt spid="5"/>
+                                          <p:spTgt spid="6"/>
                                         </p:tgtEl>
                                         <p:attrNameLst>
                                           <p:attrName>style.visibility</p:attrName>
@@ -9308,347 +8967,13 @@
                                       <p:cBhvr>
                                         <p:cTn id="15" dur="100"/>
                                         <p:tgtEl>
-                                          <p:spTgt spid="5"/>
+                                          <p:spTgt spid="6"/>
                                         </p:tgtEl>
                                       </p:cBhvr>
                                     </p:animEffect>
                                     <p:anim calcmode="lin" valueType="num">
                                       <p:cBhvr>
                                         <p:cTn id="16" dur="400" fill="hold"/>
-                                        <p:tgtEl>
-                                          <p:spTgt spid="5"/>
-                                        </p:tgtEl>
-                                        <p:attrNameLst>
-                                          <p:attrName>ppt_x</p:attrName>
-                                        </p:attrNameLst>
-                                      </p:cBhvr>
-                                      <p:tavLst>
-                                        <p:tav tm="0">
-                                          <p:val>
-                                            <p:strVal val="#ppt_x"/>
-                                          </p:val>
-                                        </p:tav>
-                                        <p:tav tm="100000">
-                                          <p:val>
-                                            <p:strVal val="#ppt_x"/>
-                                          </p:val>
-                                        </p:tav>
-                                      </p:tavLst>
-                                    </p:anim>
-                                    <p:anim calcmode="lin" valueType="num">
-                                      <p:cBhvr>
-                                        <p:cTn id="17" dur="400" fill="hold"/>
-                                        <p:tgtEl>
-                                          <p:spTgt spid="5"/>
-                                        </p:tgtEl>
-                                        <p:attrNameLst>
-                                          <p:attrName>ppt_y</p:attrName>
-                                        </p:attrNameLst>
-                                      </p:cBhvr>
-                                      <p:tavLst>
-                                        <p:tav tm="0">
-                                          <p:val>
-                                            <p:strVal val="#ppt_y+0.31"/>
-                                          </p:val>
-                                        </p:tav>
-                                        <p:tav tm="100000">
-                                          <p:val>
-                                            <p:strVal val="#ppt_y+0.31"/>
-                                          </p:val>
-                                        </p:tav>
-                                      </p:tavLst>
-                                    </p:anim>
-                                    <p:anim calcmode="lin" valueType="num">
-                                      <p:cBhvr>
-                                        <p:cTn id="18" dur="600" decel="50000" fill="hold">
-                                          <p:stCondLst>
-                                            <p:cond delay="400"/>
-                                          </p:stCondLst>
-                                        </p:cTn>
-                                        <p:tgtEl>
-                                          <p:spTgt spid="5"/>
-                                        </p:tgtEl>
-                                        <p:attrNameLst>
-                                          <p:attrName>ppt_x</p:attrName>
-                                        </p:attrNameLst>
-                                      </p:cBhvr>
-                                      <p:tavLst>
-                                        <p:tav tm="0">
-                                          <p:val>
-                                            <p:strVal val="#ppt_x"/>
-                                          </p:val>
-                                        </p:tav>
-                                        <p:tav tm="5000">
-                                          <p:val>
-                                            <p:strVal val="#ppt_x+0.0242"/>
-                                          </p:val>
-                                        </p:tav>
-                                        <p:tav tm="10000">
-                                          <p:val>
-                                            <p:strVal val="#ppt_x+0.0479"/>
-                                          </p:val>
-                                        </p:tav>
-                                        <p:tav tm="15000">
-                                          <p:val>
-                                            <p:strVal val="#ppt_x+0.0704"/>
-                                          </p:val>
-                                        </p:tav>
-                                        <p:tav tm="20000">
-                                          <p:val>
-                                            <p:strVal val="#ppt_x+0.0911"/>
-                                          </p:val>
-                                        </p:tav>
-                                        <p:tav tm="25000">
-                                          <p:val>
-                                            <p:strVal val="#ppt_x+0.1096"/>
-                                          </p:val>
-                                        </p:tav>
-                                        <p:tav tm="30000">
-                                          <p:val>
-                                            <p:strVal val="#ppt_x+0.1254"/>
-                                          </p:val>
-                                        </p:tav>
-                                        <p:tav tm="35000">
-                                          <p:val>
-                                            <p:strVal val="#ppt_x+0.1381"/>
-                                          </p:val>
-                                        </p:tav>
-                                        <p:tav tm="40000">
-                                          <p:val>
-                                            <p:strVal val="#ppt_x+0.1474"/>
-                                          </p:val>
-                                        </p:tav>
-                                        <p:tav tm="45000">
-                                          <p:val>
-                                            <p:strVal val="#ppt_x+0.1531"/>
-                                          </p:val>
-                                        </p:tav>
-                                        <p:tav tm="50000">
-                                          <p:val>
-                                            <p:strVal val="#ppt_x+0.1550"/>
-                                          </p:val>
-                                        </p:tav>
-                                        <p:tav tm="55000">
-                                          <p:val>
-                                            <p:strVal val="#ppt_x+0.1531"/>
-                                          </p:val>
-                                        </p:tav>
-                                        <p:tav tm="60000">
-                                          <p:val>
-                                            <p:strVal val="#ppt_x+0.1474"/>
-                                          </p:val>
-                                        </p:tav>
-                                        <p:tav tm="65000">
-                                          <p:val>
-                                            <p:strVal val="#ppt_x+0.1381"/>
-                                          </p:val>
-                                        </p:tav>
-                                        <p:tav tm="70000">
-                                          <p:val>
-                                            <p:strVal val="#ppt_x+0.1254"/>
-                                          </p:val>
-                                        </p:tav>
-                                        <p:tav tm="75000">
-                                          <p:val>
-                                            <p:strVal val="#ppt_x+0.1096"/>
-                                          </p:val>
-                                        </p:tav>
-                                        <p:tav tm="80000">
-                                          <p:val>
-                                            <p:strVal val="#ppt_x+0.0911"/>
-                                          </p:val>
-                                        </p:tav>
-                                        <p:tav tm="85000">
-                                          <p:val>
-                                            <p:strVal val="#ppt_x+0.0704"/>
-                                          </p:val>
-                                        </p:tav>
-                                        <p:tav tm="90000">
-                                          <p:val>
-                                            <p:strVal val="#ppt_x+0.0479"/>
-                                          </p:val>
-                                        </p:tav>
-                                        <p:tav tm="95000">
-                                          <p:val>
-                                            <p:strVal val="#ppt_x+0.0242"/>
-                                          </p:val>
-                                        </p:tav>
-                                        <p:tav tm="100000">
-                                          <p:val>
-                                            <p:strVal val="#ppt_x"/>
-                                          </p:val>
-                                        </p:tav>
-                                      </p:tavLst>
-                                    </p:anim>
-                                    <p:anim calcmode="lin" valueType="num">
-                                      <p:cBhvr>
-                                        <p:cTn id="19" dur="600" decel="50000" fill="hold">
-                                          <p:stCondLst>
-                                            <p:cond delay="400"/>
-                                          </p:stCondLst>
-                                        </p:cTn>
-                                        <p:tgtEl>
-                                          <p:spTgt spid="5"/>
-                                        </p:tgtEl>
-                                        <p:attrNameLst>
-                                          <p:attrName>ppt_y</p:attrName>
-                                        </p:attrNameLst>
-                                      </p:cBhvr>
-                                      <p:tavLst>
-                                        <p:tav tm="0">
-                                          <p:val>
-                                            <p:strVal val="#ppt_y+0.31"/>
-                                          </p:val>
-                                        </p:tav>
-                                        <p:tav tm="5000">
-                                          <p:val>
-                                            <p:strVal val="#ppt_y+0.308"/>
-                                          </p:val>
-                                        </p:tav>
-                                        <p:tav tm="10000">
-                                          <p:val>
-                                            <p:strVal val="#ppt_y+0.3024"/>
-                                          </p:val>
-                                        </p:tav>
-                                        <p:tav tm="15000">
-                                          <p:val>
-                                            <p:strVal val="#ppt_y+0.2931"/>
-                                          </p:val>
-                                        </p:tav>
-                                        <p:tav tm="20000">
-                                          <p:val>
-                                            <p:strVal val="#ppt_y+0.2804"/>
-                                          </p:val>
-                                        </p:tav>
-                                        <p:tav tm="25000">
-                                          <p:val>
-                                            <p:strVal val="#ppt_y+0.2646"/>
-                                          </p:val>
-                                        </p:tav>
-                                        <p:tav tm="30000">
-                                          <p:val>
-                                            <p:strVal val="#ppt_y+0.2461"/>
-                                          </p:val>
-                                        </p:tav>
-                                        <p:tav tm="35000">
-                                          <p:val>
-                                            <p:strVal val="#ppt_y+0.2253"/>
-                                          </p:val>
-                                        </p:tav>
-                                        <p:tav tm="40000">
-                                          <p:val>
-                                            <p:strVal val="#ppt_y+0.2029"/>
-                                          </p:val>
-                                        </p:tav>
-                                        <p:tav tm="45000">
-                                          <p:val>
-                                            <p:strVal val="#ppt_y+0.1792"/>
-                                          </p:val>
-                                        </p:tav>
-                                        <p:tav tm="50000">
-                                          <p:val>
-                                            <p:strVal val="#ppt_y+0.155"/>
-                                          </p:val>
-                                        </p:tav>
-                                        <p:tav tm="55000">
-                                          <p:val>
-                                            <p:strVal val="#ppt_y+0.1307"/>
-                                          </p:val>
-                                        </p:tav>
-                                        <p:tav tm="60000">
-                                          <p:val>
-                                            <p:strVal val="#ppt_y+0.1071"/>
-                                          </p:val>
-                                        </p:tav>
-                                        <p:tav tm="65000">
-                                          <p:val>
-                                            <p:strVal val="#ppt_y+0.0846"/>
-                                          </p:val>
-                                        </p:tav>
-                                        <p:tav tm="70000">
-                                          <p:val>
-                                            <p:strVal val="#ppt_y+0.0639"/>
-                                          </p:val>
-                                        </p:tav>
-                                        <p:tav tm="75000">
-                                          <p:val>
-                                            <p:strVal val="#ppt_y+0.0454"/>
-                                          </p:val>
-                                        </p:tav>
-                                        <p:tav tm="80000">
-                                          <p:val>
-                                            <p:strVal val="#ppt_y+0.0296"/>
-                                          </p:val>
-                                        </p:tav>
-                                        <p:tav tm="85000">
-                                          <p:val>
-                                            <p:strVal val="#ppt_y+0.0169"/>
-                                          </p:val>
-                                        </p:tav>
-                                        <p:tav tm="90000">
-                                          <p:val>
-                                            <p:strVal val="#ppt_y+0.0076"/>
-                                          </p:val>
-                                        </p:tav>
-                                        <p:tav tm="95000">
-                                          <p:val>
-                                            <p:strVal val="#ppt_y+0.0019"/>
-                                          </p:val>
-                                        </p:tav>
-                                        <p:tav tm="100000">
-                                          <p:val>
-                                            <p:strVal val="#ppt_y"/>
-                                          </p:val>
-                                        </p:tav>
-                                      </p:tavLst>
-                                    </p:anim>
-                                  </p:childTnLst>
-                                </p:cTn>
-                              </p:par>
-                            </p:childTnLst>
-                          </p:cTn>
-                        </p:par>
-                        <p:par>
-                          <p:cTn id="20" fill="hold">
-                            <p:stCondLst>
-                              <p:cond delay="2000"/>
-                            </p:stCondLst>
-                            <p:childTnLst>
-                              <p:par>
-                                <p:cTn id="21" presetID="43" presetClass="entr" presetSubtype="0" fill="hold" grpId="0" nodeType="afterEffect">
-                                  <p:stCondLst>
-                                    <p:cond delay="0"/>
-                                  </p:stCondLst>
-                                  <p:childTnLst>
-                                    <p:set>
-                                      <p:cBhvr>
-                                        <p:cTn id="22" dur="1" fill="hold">
-                                          <p:stCondLst>
-                                            <p:cond delay="0"/>
-                                          </p:stCondLst>
-                                        </p:cTn>
-                                        <p:tgtEl>
-                                          <p:spTgt spid="6"/>
-                                        </p:tgtEl>
-                                        <p:attrNameLst>
-                                          <p:attrName>style.visibility</p:attrName>
-                                        </p:attrNameLst>
-                                      </p:cBhvr>
-                                      <p:to>
-                                        <p:strVal val="visible"/>
-                                      </p:to>
-                                    </p:set>
-                                    <p:animEffect transition="in" filter="fade">
-                                      <p:cBhvr>
-                                        <p:cTn id="23" dur="100"/>
-                                        <p:tgtEl>
-                                          <p:spTgt spid="6"/>
-                                        </p:tgtEl>
-                                      </p:cBhvr>
-                                    </p:animEffect>
-                                    <p:anim calcmode="lin" valueType="num">
-                                      <p:cBhvr>
-                                        <p:cTn id="24" dur="400" fill="hold"/>
                                         <p:tgtEl>
                                           <p:spTgt spid="6"/>
                                         </p:tgtEl>
@@ -9671,7 +8996,7 @@
                                     </p:anim>
                                     <p:anim calcmode="lin" valueType="num">
                                       <p:cBhvr>
-                                        <p:cTn id="25" dur="400" fill="hold"/>
+                                        <p:cTn id="17" dur="400" fill="hold"/>
                                         <p:tgtEl>
                                           <p:spTgt spid="6"/>
                                         </p:tgtEl>
@@ -9694,7 +9019,7 @@
                                     </p:anim>
                                     <p:anim calcmode="lin" valueType="num">
                                       <p:cBhvr>
-                                        <p:cTn id="26" dur="600" decel="50000" fill="hold">
+                                        <p:cTn id="18" dur="600" decel="50000" fill="hold">
                                           <p:stCondLst>
                                             <p:cond delay="400"/>
                                           </p:stCondLst>
@@ -9816,7 +9141,7 @@
                                     </p:anim>
                                     <p:anim calcmode="lin" valueType="num">
                                       <p:cBhvr>
-                                        <p:cTn id="27" dur="600" decel="50000" fill="hold">
+                                        <p:cTn id="19" dur="600" decel="50000" fill="hold">
                                           <p:stCondLst>
                                             <p:cond delay="400"/>
                                           </p:stCondLst>
@@ -9967,7 +9292,6 @@
       </p:par>
     </p:tnLst>
     <p:bldLst>
-      <p:bldP spid="4" grpId="0" animBg="1"/>
       <p:bldP spid="5" grpId="0"/>
       <p:bldP spid="6" grpId="0"/>
     </p:bldLst>
@@ -10017,10 +9341,10 @@
           <a:p>
             <a:pPr algn="ctr"/>
             <a:r>
-              <a:rPr lang="bg-BG" sz="6000" dirty="0"/>
+              <a:rPr lang="bg-BG" sz="6000" i="1" dirty="0"/>
               <a:t>Нашият отбор</a:t>
             </a:r>
-            <a:endParaRPr lang="en-US" sz="6000" dirty="0"/>
+            <a:endParaRPr lang="en-US" sz="6000" i="1" dirty="0"/>
           </a:p>
         </p:txBody>
       </p:sp>
@@ -10159,13 +9483,13 @@
   <p:clrMapOvr>
     <a:masterClrMapping/>
   </p:clrMapOvr>
-  <mc:AlternateContent xmlns:mc="http://schemas.openxmlformats.org/markup-compatibility/2006">
-    <mc:Choice xmlns:p14="http://schemas.microsoft.com/office/powerpoint/2010/main" Requires="p14">
+  <mc:AlternateContent xmlns:mc="http://schemas.openxmlformats.org/markup-compatibility/2006" xmlns:p14="http://schemas.microsoft.com/office/powerpoint/2010/main">
+    <mc:Choice Requires="p14">
       <p:transition spd="slow" p14:dur="800">
         <p:circle/>
       </p:transition>
     </mc:Choice>
-    <mc:Fallback>
+    <mc:Fallback xmlns="">
       <p:transition spd="slow">
         <p:circle/>
       </p:transition>
@@ -10537,8 +9861,8 @@
         </p:nvSpPr>
         <p:spPr>
           <a:xfrm>
-            <a:off x="2111828" y="4322989"/>
-            <a:ext cx="8882743" cy="830997"/>
+            <a:off x="1654628" y="3710454"/>
+            <a:ext cx="8882743" cy="2308324"/>
           </a:xfrm>
           <a:prstGeom prst="rect">
             <a:avLst/>
@@ -10551,11 +9875,12 @@
           </a:bodyPr>
           <a:lstStyle/>
           <a:p>
-            <a:r>
-              <a:rPr lang="bg-BG" sz="4800" dirty="0"/>
+            <a:pPr algn="ctr"/>
+            <a:r>
+              <a:rPr lang="bg-BG" sz="7200" dirty="0"/>
               <a:t>Създаване на идеята за проекта</a:t>
             </a:r>
-            <a:endParaRPr lang="en-US" sz="4800" dirty="0"/>
+            <a:endParaRPr lang="en-US" sz="7200" dirty="0"/>
           </a:p>
         </p:txBody>
       </p:sp>
@@ -10573,8 +9898,8 @@
         </p:nvSpPr>
         <p:spPr>
           <a:xfrm>
-            <a:off x="4738650" y="1193190"/>
-            <a:ext cx="2714698" cy="2520355"/>
+            <a:off x="4738650" y="1190099"/>
+            <a:ext cx="2558795" cy="2520355"/>
           </a:xfrm>
           <a:prstGeom prst="donut">
             <a:avLst/>
@@ -10623,7 +9948,7 @@
         </p:nvSpPr>
         <p:spPr>
           <a:xfrm>
-            <a:off x="5702530" y="1546016"/>
+            <a:off x="5640386" y="1528260"/>
             <a:ext cx="1397571" cy="1569660"/>
           </a:xfrm>
           <a:prstGeom prst="rect">
@@ -11747,10 +11072,10 @@
           <a:p>
             <a:pPr algn="ctr"/>
             <a:r>
-              <a:rPr lang="bg-BG" dirty="0"/>
+              <a:rPr lang="bg-BG" i="1" dirty="0"/>
               <a:t>Идеята на проекта:</a:t>
             </a:r>
-            <a:endParaRPr lang="en-US" dirty="0"/>
+            <a:endParaRPr lang="en-US" i="1" dirty="0"/>
           </a:p>
         </p:txBody>
       </p:sp>
@@ -12187,8 +11512,8 @@
         </p:nvSpPr>
         <p:spPr>
           <a:xfrm>
-            <a:off x="3309257" y="4371975"/>
-            <a:ext cx="5834743" cy="830997"/>
+            <a:off x="1730132" y="4158911"/>
+            <a:ext cx="8566951" cy="1200329"/>
           </a:xfrm>
           <a:prstGeom prst="rect">
             <a:avLst/>
@@ -12202,10 +11527,10 @@
           <a:lstStyle/>
           <a:p>
             <a:r>
-              <a:rPr lang="bg-BG" sz="4800" dirty="0"/>
+              <a:rPr lang="bg-BG" sz="7200" dirty="0"/>
               <a:t>Развитие на проекта</a:t>
             </a:r>
-            <a:endParaRPr lang="en-US" sz="4800" dirty="0"/>
+            <a:endParaRPr lang="en-US" sz="7200" dirty="0"/>
           </a:p>
         </p:txBody>
       </p:sp>
@@ -12224,7 +11549,7 @@
         <p:spPr>
           <a:xfrm>
             <a:off x="4738650" y="1193190"/>
-            <a:ext cx="2714698" cy="2520355"/>
+            <a:ext cx="2549917" cy="2520355"/>
           </a:xfrm>
           <a:prstGeom prst="donut">
             <a:avLst/>
@@ -12273,7 +11598,7 @@
         </p:nvSpPr>
         <p:spPr>
           <a:xfrm>
-            <a:off x="5747219" y="1468670"/>
+            <a:off x="5685075" y="1433159"/>
             <a:ext cx="1397571" cy="1569660"/>
           </a:xfrm>
           <a:prstGeom prst="rect">
@@ -13390,7 +12715,12 @@
             <p:ph type="title"/>
           </p:nvPr>
         </p:nvSpPr>
-        <p:spPr/>
+        <p:spPr>
+          <a:xfrm>
+            <a:off x="838200" y="196449"/>
+            <a:ext cx="10515600" cy="1325563"/>
+          </a:xfrm>
+        </p:spPr>
         <p:txBody>
           <a:bodyPr>
             <a:normAutofit/>
@@ -13399,10 +12729,10 @@
           <a:p>
             <a:pPr algn="ctr"/>
             <a:r>
-              <a:rPr lang="bg-BG" dirty="0"/>
+              <a:rPr lang="bg-BG" i="1" dirty="0"/>
               <a:t>Развитие на проекта:</a:t>
             </a:r>
-            <a:endParaRPr lang="en-US" dirty="0"/>
+            <a:endParaRPr lang="en-US" i="1" dirty="0"/>
           </a:p>
         </p:txBody>
       </p:sp>
@@ -13419,13 +12749,13 @@
           <p:nvPr>
             <p:extLst>
               <p:ext uri="{D42A27DB-BD31-4B8C-83A1-F6EECF244321}">
-                <p14:modId xmlns:p14="http://schemas.microsoft.com/office/powerpoint/2010/main" val="3180008122"/>
+                <p14:modId xmlns:p14="http://schemas.microsoft.com/office/powerpoint/2010/main" val="1199943926"/>
               </p:ext>
             </p:extLst>
           </p:nvPr>
         </p:nvGraphicFramePr>
         <p:xfrm>
-          <a:off x="2211567" y="1574358"/>
+          <a:off x="2211567" y="1396805"/>
           <a:ext cx="7768866" cy="5001297"/>
         </p:xfrm>
         <a:graphic>
@@ -13557,92 +12887,6 @@
       </p:grpSpPr>
       <p:sp>
         <p:nvSpPr>
-          <p:cNvPr id="4" name="Circle: Hollow 3">
-            <a:extLst>
-              <a:ext uri="{FF2B5EF4-FFF2-40B4-BE49-F238E27FC236}">
-                <a16:creationId xmlns:a16="http://schemas.microsoft.com/office/drawing/2014/main" id="{DE9FAA47-A66F-DC26-CD20-90034AA80B79}"/>
-              </a:ext>
-            </a:extLst>
-          </p:cNvPr>
-          <p:cNvSpPr/>
-          <p:nvPr/>
-        </p:nvSpPr>
-        <p:spPr>
-          <a:xfrm>
-            <a:off x="5051740" y="2199330"/>
-            <a:ext cx="2088519" cy="2088519"/>
-          </a:xfrm>
-          <a:prstGeom prst="donut">
-            <a:avLst/>
-          </a:prstGeom>
-        </p:spPr>
-        <p:style>
-          <a:lnRef idx="2">
-            <a:schemeClr val="accent1">
-              <a:shade val="50000"/>
-            </a:schemeClr>
-          </a:lnRef>
-          <a:fillRef idx="1">
-            <a:schemeClr val="accent1"/>
-          </a:fillRef>
-          <a:effectRef idx="0">
-            <a:schemeClr val="accent1"/>
-          </a:effectRef>
-          <a:fontRef idx="minor">
-            <a:schemeClr val="lt1"/>
-          </a:fontRef>
-        </p:style>
-        <p:txBody>
-          <a:bodyPr rtlCol="0" anchor="ctr"/>
-          <a:lstStyle/>
-          <a:p>
-            <a:pPr algn="ctr"/>
-            <a:endParaRPr lang="en-US">
-              <a:solidFill>
-                <a:schemeClr val="tx1"/>
-              </a:solidFill>
-            </a:endParaRPr>
-          </a:p>
-        </p:txBody>
-      </p:sp>
-      <p:sp>
-        <p:nvSpPr>
-          <p:cNvPr id="5" name="TextBox 4">
-            <a:extLst>
-              <a:ext uri="{FF2B5EF4-FFF2-40B4-BE49-F238E27FC236}">
-                <a16:creationId xmlns:a16="http://schemas.microsoft.com/office/drawing/2014/main" id="{2BA9471E-3728-A60A-F1E1-D653A4EBE0FB}"/>
-              </a:ext>
-            </a:extLst>
-          </p:cNvPr>
-          <p:cNvSpPr txBox="1"/>
-          <p:nvPr/>
-        </p:nvSpPr>
-        <p:spPr>
-          <a:xfrm>
-            <a:off x="5825724" y="2690888"/>
-            <a:ext cx="604157" cy="830997"/>
-          </a:xfrm>
-          <a:prstGeom prst="rect">
-            <a:avLst/>
-          </a:prstGeom>
-          <a:noFill/>
-        </p:spPr>
-        <p:txBody>
-          <a:bodyPr wrap="square" rtlCol="0">
-            <a:spAutoFit/>
-          </a:bodyPr>
-          <a:lstStyle/>
-          <a:p>
-            <a:r>
-              <a:rPr lang="bg-BG" sz="4800" dirty="0"/>
-              <a:t>4</a:t>
-            </a:r>
-            <a:endParaRPr lang="en-US" sz="4800" dirty="0"/>
-          </a:p>
-        </p:txBody>
-      </p:sp>
-      <p:sp>
-        <p:nvSpPr>
           <p:cNvPr id="6" name="TextBox 5">
             <a:extLst>
               <a:ext uri="{FF2B5EF4-FFF2-40B4-BE49-F238E27FC236}">
@@ -13655,8 +12899,8 @@
         </p:nvSpPr>
         <p:spPr>
           <a:xfrm>
-            <a:off x="3417507" y="4779407"/>
-            <a:ext cx="5420589" cy="584775"/>
+            <a:off x="2186953" y="2028616"/>
+            <a:ext cx="7818093" cy="2800767"/>
           </a:xfrm>
           <a:prstGeom prst="rect">
             <a:avLst/>
@@ -13671,10 +12915,10 @@
           <a:p>
             <a:pPr algn="ctr"/>
             <a:r>
-              <a:rPr lang="bg-BG" sz="3200" dirty="0"/>
-              <a:t>Завършване на проекта</a:t>
-            </a:r>
-            <a:endParaRPr lang="en-US" sz="3200" dirty="0"/>
+              <a:rPr lang="bg-BG" sz="8800" i="1" dirty="0"/>
+              <a:t>Нека преминем към играта</a:t>
+            </a:r>
+            <a:endParaRPr lang="en-US" sz="8800" i="1" dirty="0"/>
           </a:p>
         </p:txBody>
       </p:sp>
@@ -13725,7 +12969,7 @@
                                           </p:stCondLst>
                                         </p:cTn>
                                         <p:tgtEl>
-                                          <p:spTgt spid="4"/>
+                                          <p:spTgt spid="6"/>
                                         </p:tgtEl>
                                         <p:attrNameLst>
                                           <p:attrName>style.visibility</p:attrName>
@@ -13739,681 +12983,13 @@
                                       <p:cBhvr>
                                         <p:cTn id="7" dur="100"/>
                                         <p:tgtEl>
-                                          <p:spTgt spid="4"/>
+                                          <p:spTgt spid="6"/>
                                         </p:tgtEl>
                                       </p:cBhvr>
                                     </p:animEffect>
                                     <p:anim calcmode="lin" valueType="num">
                                       <p:cBhvr>
                                         <p:cTn id="8" dur="400" fill="hold"/>
-                                        <p:tgtEl>
-                                          <p:spTgt spid="4"/>
-                                        </p:tgtEl>
-                                        <p:attrNameLst>
-                                          <p:attrName>ppt_x</p:attrName>
-                                        </p:attrNameLst>
-                                      </p:cBhvr>
-                                      <p:tavLst>
-                                        <p:tav tm="0">
-                                          <p:val>
-                                            <p:strVal val="#ppt_x"/>
-                                          </p:val>
-                                        </p:tav>
-                                        <p:tav tm="100000">
-                                          <p:val>
-                                            <p:strVal val="#ppt_x"/>
-                                          </p:val>
-                                        </p:tav>
-                                      </p:tavLst>
-                                    </p:anim>
-                                    <p:anim calcmode="lin" valueType="num">
-                                      <p:cBhvr>
-                                        <p:cTn id="9" dur="400" fill="hold"/>
-                                        <p:tgtEl>
-                                          <p:spTgt spid="4"/>
-                                        </p:tgtEl>
-                                        <p:attrNameLst>
-                                          <p:attrName>ppt_y</p:attrName>
-                                        </p:attrNameLst>
-                                      </p:cBhvr>
-                                      <p:tavLst>
-                                        <p:tav tm="0">
-                                          <p:val>
-                                            <p:strVal val="#ppt_y+0.31"/>
-                                          </p:val>
-                                        </p:tav>
-                                        <p:tav tm="100000">
-                                          <p:val>
-                                            <p:strVal val="#ppt_y+0.31"/>
-                                          </p:val>
-                                        </p:tav>
-                                      </p:tavLst>
-                                    </p:anim>
-                                    <p:anim calcmode="lin" valueType="num">
-                                      <p:cBhvr>
-                                        <p:cTn id="10" dur="600" decel="50000" fill="hold">
-                                          <p:stCondLst>
-                                            <p:cond delay="400"/>
-                                          </p:stCondLst>
-                                        </p:cTn>
-                                        <p:tgtEl>
-                                          <p:spTgt spid="4"/>
-                                        </p:tgtEl>
-                                        <p:attrNameLst>
-                                          <p:attrName>ppt_x</p:attrName>
-                                        </p:attrNameLst>
-                                      </p:cBhvr>
-                                      <p:tavLst>
-                                        <p:tav tm="0">
-                                          <p:val>
-                                            <p:strVal val="#ppt_x"/>
-                                          </p:val>
-                                        </p:tav>
-                                        <p:tav tm="5000">
-                                          <p:val>
-                                            <p:strVal val="#ppt_x+0.0242"/>
-                                          </p:val>
-                                        </p:tav>
-                                        <p:tav tm="10000">
-                                          <p:val>
-                                            <p:strVal val="#ppt_x+0.0479"/>
-                                          </p:val>
-                                        </p:tav>
-                                        <p:tav tm="15000">
-                                          <p:val>
-                                            <p:strVal val="#ppt_x+0.0704"/>
-                                          </p:val>
-                                        </p:tav>
-                                        <p:tav tm="20000">
-                                          <p:val>
-                                            <p:strVal val="#ppt_x+0.0911"/>
-                                          </p:val>
-                                        </p:tav>
-                                        <p:tav tm="25000">
-                                          <p:val>
-                                            <p:strVal val="#ppt_x+0.1096"/>
-                                          </p:val>
-                                        </p:tav>
-                                        <p:tav tm="30000">
-                                          <p:val>
-                                            <p:strVal val="#ppt_x+0.1254"/>
-                                          </p:val>
-                                        </p:tav>
-                                        <p:tav tm="35000">
-                                          <p:val>
-                                            <p:strVal val="#ppt_x+0.1381"/>
-                                          </p:val>
-                                        </p:tav>
-                                        <p:tav tm="40000">
-                                          <p:val>
-                                            <p:strVal val="#ppt_x+0.1474"/>
-                                          </p:val>
-                                        </p:tav>
-                                        <p:tav tm="45000">
-                                          <p:val>
-                                            <p:strVal val="#ppt_x+0.1531"/>
-                                          </p:val>
-                                        </p:tav>
-                                        <p:tav tm="50000">
-                                          <p:val>
-                                            <p:strVal val="#ppt_x+0.1550"/>
-                                          </p:val>
-                                        </p:tav>
-                                        <p:tav tm="55000">
-                                          <p:val>
-                                            <p:strVal val="#ppt_x+0.1531"/>
-                                          </p:val>
-                                        </p:tav>
-                                        <p:tav tm="60000">
-                                          <p:val>
-                                            <p:strVal val="#ppt_x+0.1474"/>
-                                          </p:val>
-                                        </p:tav>
-                                        <p:tav tm="65000">
-                                          <p:val>
-                                            <p:strVal val="#ppt_x+0.1381"/>
-                                          </p:val>
-                                        </p:tav>
-                                        <p:tav tm="70000">
-                                          <p:val>
-                                            <p:strVal val="#ppt_x+0.1254"/>
-                                          </p:val>
-                                        </p:tav>
-                                        <p:tav tm="75000">
-                                          <p:val>
-                                            <p:strVal val="#ppt_x+0.1096"/>
-                                          </p:val>
-                                        </p:tav>
-                                        <p:tav tm="80000">
-                                          <p:val>
-                                            <p:strVal val="#ppt_x+0.0911"/>
-                                          </p:val>
-                                        </p:tav>
-                                        <p:tav tm="85000">
-                                          <p:val>
-                                            <p:strVal val="#ppt_x+0.0704"/>
-                                          </p:val>
-                                        </p:tav>
-                                        <p:tav tm="90000">
-                                          <p:val>
-                                            <p:strVal val="#ppt_x+0.0479"/>
-                                          </p:val>
-                                        </p:tav>
-                                        <p:tav tm="95000">
-                                          <p:val>
-                                            <p:strVal val="#ppt_x+0.0242"/>
-                                          </p:val>
-                                        </p:tav>
-                                        <p:tav tm="100000">
-                                          <p:val>
-                                            <p:strVal val="#ppt_x"/>
-                                          </p:val>
-                                        </p:tav>
-                                      </p:tavLst>
-                                    </p:anim>
-                                    <p:anim calcmode="lin" valueType="num">
-                                      <p:cBhvr>
-                                        <p:cTn id="11" dur="600" decel="50000" fill="hold">
-                                          <p:stCondLst>
-                                            <p:cond delay="400"/>
-                                          </p:stCondLst>
-                                        </p:cTn>
-                                        <p:tgtEl>
-                                          <p:spTgt spid="4"/>
-                                        </p:tgtEl>
-                                        <p:attrNameLst>
-                                          <p:attrName>ppt_y</p:attrName>
-                                        </p:attrNameLst>
-                                      </p:cBhvr>
-                                      <p:tavLst>
-                                        <p:tav tm="0">
-                                          <p:val>
-                                            <p:strVal val="#ppt_y+0.31"/>
-                                          </p:val>
-                                        </p:tav>
-                                        <p:tav tm="5000">
-                                          <p:val>
-                                            <p:strVal val="#ppt_y+0.308"/>
-                                          </p:val>
-                                        </p:tav>
-                                        <p:tav tm="10000">
-                                          <p:val>
-                                            <p:strVal val="#ppt_y+0.3024"/>
-                                          </p:val>
-                                        </p:tav>
-                                        <p:tav tm="15000">
-                                          <p:val>
-                                            <p:strVal val="#ppt_y+0.2931"/>
-                                          </p:val>
-                                        </p:tav>
-                                        <p:tav tm="20000">
-                                          <p:val>
-                                            <p:strVal val="#ppt_y+0.2804"/>
-                                          </p:val>
-                                        </p:tav>
-                                        <p:tav tm="25000">
-                                          <p:val>
-                                            <p:strVal val="#ppt_y+0.2646"/>
-                                          </p:val>
-                                        </p:tav>
-                                        <p:tav tm="30000">
-                                          <p:val>
-                                            <p:strVal val="#ppt_y+0.2461"/>
-                                          </p:val>
-                                        </p:tav>
-                                        <p:tav tm="35000">
-                                          <p:val>
-                                            <p:strVal val="#ppt_y+0.2253"/>
-                                          </p:val>
-                                        </p:tav>
-                                        <p:tav tm="40000">
-                                          <p:val>
-                                            <p:strVal val="#ppt_y+0.2029"/>
-                                          </p:val>
-                                        </p:tav>
-                                        <p:tav tm="45000">
-                                          <p:val>
-                                            <p:strVal val="#ppt_y+0.1792"/>
-                                          </p:val>
-                                        </p:tav>
-                                        <p:tav tm="50000">
-                                          <p:val>
-                                            <p:strVal val="#ppt_y+0.155"/>
-                                          </p:val>
-                                        </p:tav>
-                                        <p:tav tm="55000">
-                                          <p:val>
-                                            <p:strVal val="#ppt_y+0.1307"/>
-                                          </p:val>
-                                        </p:tav>
-                                        <p:tav tm="60000">
-                                          <p:val>
-                                            <p:strVal val="#ppt_y+0.1071"/>
-                                          </p:val>
-                                        </p:tav>
-                                        <p:tav tm="65000">
-                                          <p:val>
-                                            <p:strVal val="#ppt_y+0.0846"/>
-                                          </p:val>
-                                        </p:tav>
-                                        <p:tav tm="70000">
-                                          <p:val>
-                                            <p:strVal val="#ppt_y+0.0639"/>
-                                          </p:val>
-                                        </p:tav>
-                                        <p:tav tm="75000">
-                                          <p:val>
-                                            <p:strVal val="#ppt_y+0.0454"/>
-                                          </p:val>
-                                        </p:tav>
-                                        <p:tav tm="80000">
-                                          <p:val>
-                                            <p:strVal val="#ppt_y+0.0296"/>
-                                          </p:val>
-                                        </p:tav>
-                                        <p:tav tm="85000">
-                                          <p:val>
-                                            <p:strVal val="#ppt_y+0.0169"/>
-                                          </p:val>
-                                        </p:tav>
-                                        <p:tav tm="90000">
-                                          <p:val>
-                                            <p:strVal val="#ppt_y+0.0076"/>
-                                          </p:val>
-                                        </p:tav>
-                                        <p:tav tm="95000">
-                                          <p:val>
-                                            <p:strVal val="#ppt_y+0.0019"/>
-                                          </p:val>
-                                        </p:tav>
-                                        <p:tav tm="100000">
-                                          <p:val>
-                                            <p:strVal val="#ppt_y"/>
-                                          </p:val>
-                                        </p:tav>
-                                      </p:tavLst>
-                                    </p:anim>
-                                  </p:childTnLst>
-                                </p:cTn>
-                              </p:par>
-                            </p:childTnLst>
-                          </p:cTn>
-                        </p:par>
-                        <p:par>
-                          <p:cTn id="12" fill="hold">
-                            <p:stCondLst>
-                              <p:cond delay="1000"/>
-                            </p:stCondLst>
-                            <p:childTnLst>
-                              <p:par>
-                                <p:cTn id="13" presetID="43" presetClass="entr" presetSubtype="0" fill="hold" grpId="0" nodeType="afterEffect">
-                                  <p:stCondLst>
-                                    <p:cond delay="0"/>
-                                  </p:stCondLst>
-                                  <p:childTnLst>
-                                    <p:set>
-                                      <p:cBhvr>
-                                        <p:cTn id="14" dur="1" fill="hold">
-                                          <p:stCondLst>
-                                            <p:cond delay="0"/>
-                                          </p:stCondLst>
-                                        </p:cTn>
-                                        <p:tgtEl>
-                                          <p:spTgt spid="5"/>
-                                        </p:tgtEl>
-                                        <p:attrNameLst>
-                                          <p:attrName>style.visibility</p:attrName>
-                                        </p:attrNameLst>
-                                      </p:cBhvr>
-                                      <p:to>
-                                        <p:strVal val="visible"/>
-                                      </p:to>
-                                    </p:set>
-                                    <p:animEffect transition="in" filter="fade">
-                                      <p:cBhvr>
-                                        <p:cTn id="15" dur="100"/>
-                                        <p:tgtEl>
-                                          <p:spTgt spid="5"/>
-                                        </p:tgtEl>
-                                      </p:cBhvr>
-                                    </p:animEffect>
-                                    <p:anim calcmode="lin" valueType="num">
-                                      <p:cBhvr>
-                                        <p:cTn id="16" dur="400" fill="hold"/>
-                                        <p:tgtEl>
-                                          <p:spTgt spid="5"/>
-                                        </p:tgtEl>
-                                        <p:attrNameLst>
-                                          <p:attrName>ppt_x</p:attrName>
-                                        </p:attrNameLst>
-                                      </p:cBhvr>
-                                      <p:tavLst>
-                                        <p:tav tm="0">
-                                          <p:val>
-                                            <p:strVal val="#ppt_x"/>
-                                          </p:val>
-                                        </p:tav>
-                                        <p:tav tm="100000">
-                                          <p:val>
-                                            <p:strVal val="#ppt_x"/>
-                                          </p:val>
-                                        </p:tav>
-                                      </p:tavLst>
-                                    </p:anim>
-                                    <p:anim calcmode="lin" valueType="num">
-                                      <p:cBhvr>
-                                        <p:cTn id="17" dur="400" fill="hold"/>
-                                        <p:tgtEl>
-                                          <p:spTgt spid="5"/>
-                                        </p:tgtEl>
-                                        <p:attrNameLst>
-                                          <p:attrName>ppt_y</p:attrName>
-                                        </p:attrNameLst>
-                                      </p:cBhvr>
-                                      <p:tavLst>
-                                        <p:tav tm="0">
-                                          <p:val>
-                                            <p:strVal val="#ppt_y+0.31"/>
-                                          </p:val>
-                                        </p:tav>
-                                        <p:tav tm="100000">
-                                          <p:val>
-                                            <p:strVal val="#ppt_y+0.31"/>
-                                          </p:val>
-                                        </p:tav>
-                                      </p:tavLst>
-                                    </p:anim>
-                                    <p:anim calcmode="lin" valueType="num">
-                                      <p:cBhvr>
-                                        <p:cTn id="18" dur="600" decel="50000" fill="hold">
-                                          <p:stCondLst>
-                                            <p:cond delay="400"/>
-                                          </p:stCondLst>
-                                        </p:cTn>
-                                        <p:tgtEl>
-                                          <p:spTgt spid="5"/>
-                                        </p:tgtEl>
-                                        <p:attrNameLst>
-                                          <p:attrName>ppt_x</p:attrName>
-                                        </p:attrNameLst>
-                                      </p:cBhvr>
-                                      <p:tavLst>
-                                        <p:tav tm="0">
-                                          <p:val>
-                                            <p:strVal val="#ppt_x"/>
-                                          </p:val>
-                                        </p:tav>
-                                        <p:tav tm="5000">
-                                          <p:val>
-                                            <p:strVal val="#ppt_x+0.0242"/>
-                                          </p:val>
-                                        </p:tav>
-                                        <p:tav tm="10000">
-                                          <p:val>
-                                            <p:strVal val="#ppt_x+0.0479"/>
-                                          </p:val>
-                                        </p:tav>
-                                        <p:tav tm="15000">
-                                          <p:val>
-                                            <p:strVal val="#ppt_x+0.0704"/>
-                                          </p:val>
-                                        </p:tav>
-                                        <p:tav tm="20000">
-                                          <p:val>
-                                            <p:strVal val="#ppt_x+0.0911"/>
-                                          </p:val>
-                                        </p:tav>
-                                        <p:tav tm="25000">
-                                          <p:val>
-                                            <p:strVal val="#ppt_x+0.1096"/>
-                                          </p:val>
-                                        </p:tav>
-                                        <p:tav tm="30000">
-                                          <p:val>
-                                            <p:strVal val="#ppt_x+0.1254"/>
-                                          </p:val>
-                                        </p:tav>
-                                        <p:tav tm="35000">
-                                          <p:val>
-                                            <p:strVal val="#ppt_x+0.1381"/>
-                                          </p:val>
-                                        </p:tav>
-                                        <p:tav tm="40000">
-                                          <p:val>
-                                            <p:strVal val="#ppt_x+0.1474"/>
-                                          </p:val>
-                                        </p:tav>
-                                        <p:tav tm="45000">
-                                          <p:val>
-                                            <p:strVal val="#ppt_x+0.1531"/>
-                                          </p:val>
-                                        </p:tav>
-                                        <p:tav tm="50000">
-                                          <p:val>
-                                            <p:strVal val="#ppt_x+0.1550"/>
-                                          </p:val>
-                                        </p:tav>
-                                        <p:tav tm="55000">
-                                          <p:val>
-                                            <p:strVal val="#ppt_x+0.1531"/>
-                                          </p:val>
-                                        </p:tav>
-                                        <p:tav tm="60000">
-                                          <p:val>
-                                            <p:strVal val="#ppt_x+0.1474"/>
-                                          </p:val>
-                                        </p:tav>
-                                        <p:tav tm="65000">
-                                          <p:val>
-                                            <p:strVal val="#ppt_x+0.1381"/>
-                                          </p:val>
-                                        </p:tav>
-                                        <p:tav tm="70000">
-                                          <p:val>
-                                            <p:strVal val="#ppt_x+0.1254"/>
-                                          </p:val>
-                                        </p:tav>
-                                        <p:tav tm="75000">
-                                          <p:val>
-                                            <p:strVal val="#ppt_x+0.1096"/>
-                                          </p:val>
-                                        </p:tav>
-                                        <p:tav tm="80000">
-                                          <p:val>
-                                            <p:strVal val="#ppt_x+0.0911"/>
-                                          </p:val>
-                                        </p:tav>
-                                        <p:tav tm="85000">
-                                          <p:val>
-                                            <p:strVal val="#ppt_x+0.0704"/>
-                                          </p:val>
-                                        </p:tav>
-                                        <p:tav tm="90000">
-                                          <p:val>
-                                            <p:strVal val="#ppt_x+0.0479"/>
-                                          </p:val>
-                                        </p:tav>
-                                        <p:tav tm="95000">
-                                          <p:val>
-                                            <p:strVal val="#ppt_x+0.0242"/>
-                                          </p:val>
-                                        </p:tav>
-                                        <p:tav tm="100000">
-                                          <p:val>
-                                            <p:strVal val="#ppt_x"/>
-                                          </p:val>
-                                        </p:tav>
-                                      </p:tavLst>
-                                    </p:anim>
-                                    <p:anim calcmode="lin" valueType="num">
-                                      <p:cBhvr>
-                                        <p:cTn id="19" dur="600" decel="50000" fill="hold">
-                                          <p:stCondLst>
-                                            <p:cond delay="400"/>
-                                          </p:stCondLst>
-                                        </p:cTn>
-                                        <p:tgtEl>
-                                          <p:spTgt spid="5"/>
-                                        </p:tgtEl>
-                                        <p:attrNameLst>
-                                          <p:attrName>ppt_y</p:attrName>
-                                        </p:attrNameLst>
-                                      </p:cBhvr>
-                                      <p:tavLst>
-                                        <p:tav tm="0">
-                                          <p:val>
-                                            <p:strVal val="#ppt_y+0.31"/>
-                                          </p:val>
-                                        </p:tav>
-                                        <p:tav tm="5000">
-                                          <p:val>
-                                            <p:strVal val="#ppt_y+0.308"/>
-                                          </p:val>
-                                        </p:tav>
-                                        <p:tav tm="10000">
-                                          <p:val>
-                                            <p:strVal val="#ppt_y+0.3024"/>
-                                          </p:val>
-                                        </p:tav>
-                                        <p:tav tm="15000">
-                                          <p:val>
-                                            <p:strVal val="#ppt_y+0.2931"/>
-                                          </p:val>
-                                        </p:tav>
-                                        <p:tav tm="20000">
-                                          <p:val>
-                                            <p:strVal val="#ppt_y+0.2804"/>
-                                          </p:val>
-                                        </p:tav>
-                                        <p:tav tm="25000">
-                                          <p:val>
-                                            <p:strVal val="#ppt_y+0.2646"/>
-                                          </p:val>
-                                        </p:tav>
-                                        <p:tav tm="30000">
-                                          <p:val>
-                                            <p:strVal val="#ppt_y+0.2461"/>
-                                          </p:val>
-                                        </p:tav>
-                                        <p:tav tm="35000">
-                                          <p:val>
-                                            <p:strVal val="#ppt_y+0.2253"/>
-                                          </p:val>
-                                        </p:tav>
-                                        <p:tav tm="40000">
-                                          <p:val>
-                                            <p:strVal val="#ppt_y+0.2029"/>
-                                          </p:val>
-                                        </p:tav>
-                                        <p:tav tm="45000">
-                                          <p:val>
-                                            <p:strVal val="#ppt_y+0.1792"/>
-                                          </p:val>
-                                        </p:tav>
-                                        <p:tav tm="50000">
-                                          <p:val>
-                                            <p:strVal val="#ppt_y+0.155"/>
-                                          </p:val>
-                                        </p:tav>
-                                        <p:tav tm="55000">
-                                          <p:val>
-                                            <p:strVal val="#ppt_y+0.1307"/>
-                                          </p:val>
-                                        </p:tav>
-                                        <p:tav tm="60000">
-                                          <p:val>
-                                            <p:strVal val="#ppt_y+0.1071"/>
-                                          </p:val>
-                                        </p:tav>
-                                        <p:tav tm="65000">
-                                          <p:val>
-                                            <p:strVal val="#ppt_y+0.0846"/>
-                                          </p:val>
-                                        </p:tav>
-                                        <p:tav tm="70000">
-                                          <p:val>
-                                            <p:strVal val="#ppt_y+0.0639"/>
-                                          </p:val>
-                                        </p:tav>
-                                        <p:tav tm="75000">
-                                          <p:val>
-                                            <p:strVal val="#ppt_y+0.0454"/>
-                                          </p:val>
-                                        </p:tav>
-                                        <p:tav tm="80000">
-                                          <p:val>
-                                            <p:strVal val="#ppt_y+0.0296"/>
-                                          </p:val>
-                                        </p:tav>
-                                        <p:tav tm="85000">
-                                          <p:val>
-                                            <p:strVal val="#ppt_y+0.0169"/>
-                                          </p:val>
-                                        </p:tav>
-                                        <p:tav tm="90000">
-                                          <p:val>
-                                            <p:strVal val="#ppt_y+0.0076"/>
-                                          </p:val>
-                                        </p:tav>
-                                        <p:tav tm="95000">
-                                          <p:val>
-                                            <p:strVal val="#ppt_y+0.0019"/>
-                                          </p:val>
-                                        </p:tav>
-                                        <p:tav tm="100000">
-                                          <p:val>
-                                            <p:strVal val="#ppt_y"/>
-                                          </p:val>
-                                        </p:tav>
-                                      </p:tavLst>
-                                    </p:anim>
-                                  </p:childTnLst>
-                                </p:cTn>
-                              </p:par>
-                            </p:childTnLst>
-                          </p:cTn>
-                        </p:par>
-                        <p:par>
-                          <p:cTn id="20" fill="hold">
-                            <p:stCondLst>
-                              <p:cond delay="2000"/>
-                            </p:stCondLst>
-                            <p:childTnLst>
-                              <p:par>
-                                <p:cTn id="21" presetID="43" presetClass="entr" presetSubtype="0" fill="hold" grpId="0" nodeType="afterEffect">
-                                  <p:stCondLst>
-                                    <p:cond delay="0"/>
-                                  </p:stCondLst>
-                                  <p:childTnLst>
-                                    <p:set>
-                                      <p:cBhvr>
-                                        <p:cTn id="22" dur="1" fill="hold">
-                                          <p:stCondLst>
-                                            <p:cond delay="0"/>
-                                          </p:stCondLst>
-                                        </p:cTn>
-                                        <p:tgtEl>
-                                          <p:spTgt spid="6"/>
-                                        </p:tgtEl>
-                                        <p:attrNameLst>
-                                          <p:attrName>style.visibility</p:attrName>
-                                        </p:attrNameLst>
-                                      </p:cBhvr>
-                                      <p:to>
-                                        <p:strVal val="visible"/>
-                                      </p:to>
-                                    </p:set>
-                                    <p:animEffect transition="in" filter="fade">
-                                      <p:cBhvr>
-                                        <p:cTn id="23" dur="100"/>
-                                        <p:tgtEl>
-                                          <p:spTgt spid="6"/>
-                                        </p:tgtEl>
-                                      </p:cBhvr>
-                                    </p:animEffect>
-                                    <p:anim calcmode="lin" valueType="num">
-                                      <p:cBhvr>
-                                        <p:cTn id="24" dur="400" fill="hold"/>
                                         <p:tgtEl>
                                           <p:spTgt spid="6"/>
                                         </p:tgtEl>
@@ -14436,7 +13012,7 @@
                                     </p:anim>
                                     <p:anim calcmode="lin" valueType="num">
                                       <p:cBhvr>
-                                        <p:cTn id="25" dur="400" fill="hold"/>
+                                        <p:cTn id="9" dur="400" fill="hold"/>
                                         <p:tgtEl>
                                           <p:spTgt spid="6"/>
                                         </p:tgtEl>
@@ -14459,7 +13035,7 @@
                                     </p:anim>
                                     <p:anim calcmode="lin" valueType="num">
                                       <p:cBhvr>
-                                        <p:cTn id="26" dur="600" decel="50000" fill="hold">
+                                        <p:cTn id="10" dur="600" decel="50000" fill="hold">
                                           <p:stCondLst>
                                             <p:cond delay="400"/>
                                           </p:stCondLst>
@@ -14581,7 +13157,7 @@
                                     </p:anim>
                                     <p:anim calcmode="lin" valueType="num">
                                       <p:cBhvr>
-                                        <p:cTn id="27" dur="600" decel="50000" fill="hold">
+                                        <p:cTn id="11" dur="600" decel="50000" fill="hold">
                                           <p:stCondLst>
                                             <p:cond delay="400"/>
                                           </p:stCondLst>
@@ -14732,8 +13308,6 @@
       </p:par>
     </p:tnLst>
     <p:bldLst>
-      <p:bldP spid="4" grpId="0" animBg="1"/>
-      <p:bldP spid="5" grpId="0"/>
       <p:bldP spid="6" grpId="0"/>
     </p:bldLst>
   </p:timing>

</xml_diff>